<commit_message>
12.05 PSP(김지환, 함형우) 수정, SRS 수정, TestCase 수정
</commit_message>
<xml_diff>
--- a/SRS/1.3/4팀_일정추천앱_UC_Spec_1.3.pptx
+++ b/SRS/1.3/4팀_일정추천앱_UC_Spec_1.3.pptx
@@ -241,7 +241,7 @@
           <a:p>
             <a:fld id="{8CEFE3E5-4A4F-4495-B869-560A55522401}" type="datetimeFigureOut">
               <a:rPr lang="ko-KR" altLang="en-US" smtClean="0"/>
-              <a:t>2019-12-04</a:t>
+              <a:t>2019-12-05</a:t>
             </a:fld>
             <a:endParaRPr lang="ko-KR" altLang="en-US"/>
           </a:p>
@@ -29268,7 +29268,7 @@
           <p:nvPr>
             <p:extLst>
               <p:ext uri="{D42A27DB-BD31-4B8C-83A1-F6EECF244321}">
-                <p14:modId xmlns:p14="http://schemas.microsoft.com/office/powerpoint/2010/main" val="1965079830"/>
+                <p14:modId xmlns:p14="http://schemas.microsoft.com/office/powerpoint/2010/main" val="3095677239"/>
               </p:ext>
             </p:extLst>
           </p:nvPr>
@@ -30390,29 +30390,27 @@
                         </a:rPr>
                         <a:t> 조회 </a:t>
                       </a:r>
-                      <a:r>
-                        <a:rPr lang="en-US" altLang="ko-KR" sz="1100" b="0" kern="100" dirty="0">
-                          <a:solidFill>
-                            <a:srgbClr val="FF0000"/>
-                          </a:solidFill>
-                          <a:effectLst/>
-                        </a:rPr>
-                        <a:t>(AF2)</a:t>
-                      </a:r>
                       <a:endParaRPr lang="en-US" altLang="ko-KR" sz="1100" b="0" kern="100" dirty="0">
                         <a:effectLst/>
                       </a:endParaRPr>
                     </a:p>
                     <a:p>
-                      <a:pPr marL="648000" indent="0" algn="just" latinLnBrk="1">
+                      <a:pPr marL="648000" marR="0" lvl="1" indent="0" algn="just" defTabSz="914400" rtl="0" eaLnBrk="1" fontAlgn="auto" latinLnBrk="1" hangingPunct="1">
                         <a:lnSpc>
                           <a:spcPct val="115000"/>
                         </a:lnSpc>
+                        <a:spcBef>
+                          <a:spcPts val="0"/>
+                        </a:spcBef>
                         <a:spcAft>
                           <a:spcPts val="0"/>
                         </a:spcAft>
+                        <a:buClrTx/>
+                        <a:buSzTx/>
                         <a:buFontTx/>
                         <a:buNone/>
+                        <a:tabLst/>
+                        <a:defRPr/>
                       </a:pPr>
                       <a:r>
                         <a:rPr lang="ko-KR" altLang="en-US" sz="1100" b="0" kern="100" dirty="0">
@@ -31494,14 +31492,14 @@
           <p:nvPr>
             <p:extLst>
               <p:ext uri="{D42A27DB-BD31-4B8C-83A1-F6EECF244321}">
-                <p14:modId xmlns:p14="http://schemas.microsoft.com/office/powerpoint/2010/main" val="428643996"/>
+                <p14:modId xmlns:p14="http://schemas.microsoft.com/office/powerpoint/2010/main" val="970379435"/>
               </p:ext>
             </p:extLst>
           </p:nvPr>
         </p:nvGraphicFramePr>
         <p:xfrm>
           <a:off x="251520" y="979752"/>
-          <a:ext cx="8640960" cy="5024125"/>
+          <a:ext cx="8640960" cy="4785630"/>
         </p:xfrm>
         <a:graphic>
           <a:graphicData uri="http://schemas.openxmlformats.org/drawingml/2006/table">
@@ -31757,7 +31755,7 @@
                         <a:rPr lang="ko-KR" altLang="en-US" sz="1100" b="0" kern="100" dirty="0">
                           <a:effectLst/>
                         </a:rPr>
-                        <a:t>시간과 장소에 대한 피드백이 모두 </a:t>
+                        <a:t>시간과 장소에 대한 피드백이 하나라도 </a:t>
                       </a:r>
                       <a:r>
                         <a:rPr lang="en-US" altLang="ko-KR" sz="1100" b="0" kern="100" dirty="0">
@@ -31769,133 +31767,76 @@
                         <a:rPr lang="ko-KR" altLang="en-US" sz="1100" b="0" kern="100" dirty="0">
                           <a:effectLst/>
                         </a:rPr>
-                        <a:t>보통</a:t>
+                        <a:t>좋음</a:t>
                       </a:r>
                       <a:r>
                         <a:rPr lang="en-US" altLang="ko-KR" sz="1100" b="0" kern="100" dirty="0">
                           <a:effectLst/>
                         </a:rPr>
+                        <a:t>’ </a:t>
+                      </a:r>
+                      <a:r>
+                        <a:rPr lang="ko-KR" altLang="en-US" sz="1100" b="0" kern="100" dirty="0">
+                          <a:effectLst/>
+                        </a:rPr>
+                        <a:t>혹은 </a:t>
+                      </a:r>
+                      <a:r>
+                        <a:rPr lang="en-US" altLang="ko-KR" sz="1100" b="0" kern="100" dirty="0">
+                          <a:effectLst/>
+                        </a:rPr>
                         <a:t>‘</a:t>
                       </a:r>
                       <a:r>
                         <a:rPr lang="ko-KR" altLang="en-US" sz="1100" b="0" kern="100" dirty="0">
                           <a:effectLst/>
                         </a:rPr>
-                        <a:t>인 경우 본 </a:t>
+                        <a:t>나쁨</a:t>
+                      </a:r>
+                      <a:r>
+                        <a:rPr lang="en-US" altLang="ko-KR" sz="1100" b="0" kern="100" dirty="0">
+                          <a:effectLst/>
+                        </a:rPr>
+                        <a:t>‘</a:t>
+                      </a:r>
+                      <a:r>
+                        <a:rPr lang="ko-KR" altLang="en-US" sz="1100" b="0" kern="100" dirty="0">
+                          <a:effectLst/>
+                        </a:rPr>
+                        <a:t>인 경우 피드백에 대한 우선순위 재조정</a:t>
+                      </a:r>
+                      <a:r>
+                        <a:rPr lang="en-US" altLang="ko-KR" sz="1100" b="0" kern="100" dirty="0">
+                          <a:effectLst/>
+                        </a:rPr>
+                        <a:t>(step5) </a:t>
                       </a:r>
                       <a:r>
                         <a:rPr lang="ko-KR" altLang="en-US" sz="1100" b="0" kern="100" dirty="0" err="1">
                           <a:effectLst/>
                         </a:rPr>
-                        <a:t>유스케이스를</a:t>
+                        <a:t>서브플로우를</a:t>
                       </a:r>
                       <a:r>
                         <a:rPr lang="ko-KR" altLang="en-US" sz="1100" b="0" kern="100" dirty="0">
                           <a:effectLst/>
                         </a:rPr>
-                        <a:t> 종료한다</a:t>
+                        <a:t> 수행한다</a:t>
                       </a:r>
                       <a:r>
                         <a:rPr lang="en-US" altLang="ko-KR" sz="1100" b="0" kern="100" dirty="0">
                           <a:effectLst/>
                         </a:rPr>
-                        <a:t>.</a:t>
-                      </a:r>
-                    </a:p>
-                    <a:p>
-                      <a:pPr marL="684000" indent="0" algn="just" latinLnBrk="1">
-                        <a:lnSpc>
-                          <a:spcPct val="115000"/>
-                        </a:lnSpc>
-                        <a:spcAft>
-                          <a:spcPts val="0"/>
-                        </a:spcAft>
-                        <a:buFontTx/>
-                        <a:buNone/>
-                      </a:pPr>
+                        <a:t>. </a:t>
+                      </a:r>
                       <a:r>
                         <a:rPr lang="en-US" altLang="ko-KR" sz="1100" b="0" kern="100" dirty="0">
-                          <a:effectLst/>
-                        </a:rPr>
-                        <a:t>-</a:t>
-                      </a:r>
-                      <a:r>
-                        <a:rPr lang="ko-KR" altLang="en-US" sz="1100" b="0" kern="100" dirty="0">
-                          <a:effectLst/>
-                        </a:rPr>
-                        <a:t>시간과 장소에 대한 피드백이 하나라도 </a:t>
-                      </a:r>
-                      <a:r>
-                        <a:rPr lang="en-US" altLang="ko-KR" sz="1100" b="0" kern="100" dirty="0">
-                          <a:effectLst/>
-                        </a:rPr>
-                        <a:t>‘</a:t>
-                      </a:r>
-                      <a:r>
-                        <a:rPr lang="ko-KR" altLang="en-US" sz="1100" b="0" kern="100" dirty="0">
-                          <a:effectLst/>
-                        </a:rPr>
-                        <a:t>좋음</a:t>
-                      </a:r>
-                      <a:r>
-                        <a:rPr lang="en-US" altLang="ko-KR" sz="1100" b="0" kern="100" dirty="0">
-                          <a:effectLst/>
-                        </a:rPr>
-                        <a:t>’ </a:t>
-                      </a:r>
-                      <a:r>
-                        <a:rPr lang="ko-KR" altLang="en-US" sz="1100" b="0" kern="100" dirty="0">
-                          <a:effectLst/>
-                        </a:rPr>
-                        <a:t>혹은 </a:t>
-                      </a:r>
-                      <a:r>
-                        <a:rPr lang="en-US" altLang="ko-KR" sz="1100" b="0" kern="100" dirty="0">
-                          <a:effectLst/>
-                        </a:rPr>
-                        <a:t>‘</a:t>
-                      </a:r>
-                      <a:r>
-                        <a:rPr lang="ko-KR" altLang="en-US" sz="1100" b="0" kern="100" dirty="0">
-                          <a:effectLst/>
-                        </a:rPr>
-                        <a:t>나쁨</a:t>
-                      </a:r>
-                      <a:r>
-                        <a:rPr lang="en-US" altLang="ko-KR" sz="1100" b="0" kern="100" dirty="0">
-                          <a:effectLst/>
-                        </a:rPr>
-                        <a:t>‘</a:t>
-                      </a:r>
-                      <a:r>
-                        <a:rPr lang="ko-KR" altLang="en-US" sz="1100" b="0" kern="100" dirty="0">
-                          <a:effectLst/>
-                        </a:rPr>
-                        <a:t>인 경우 피드백에 대한 우선순위 재조정</a:t>
-                      </a:r>
-                      <a:r>
-                        <a:rPr lang="en-US" altLang="ko-KR" sz="1100" b="0" kern="100" dirty="0">
-                          <a:effectLst/>
-                        </a:rPr>
-                        <a:t>(step5) </a:t>
-                      </a:r>
-                      <a:r>
-                        <a:rPr lang="ko-KR" altLang="en-US" sz="1100" b="0" kern="100" dirty="0" err="1">
-                          <a:effectLst/>
-                        </a:rPr>
-                        <a:t>서브플로우를</a:t>
-                      </a:r>
-                      <a:r>
-                        <a:rPr lang="ko-KR" altLang="en-US" sz="1100" b="0" kern="100" dirty="0">
-                          <a:effectLst/>
-                        </a:rPr>
-                        <a:t> 수행한다</a:t>
-                      </a:r>
-                      <a:r>
-                        <a:rPr lang="en-US" altLang="ko-KR" sz="1100" b="0" kern="100" dirty="0">
-                          <a:effectLst/>
-                        </a:rPr>
-                        <a:t>.</a:t>
+                          <a:solidFill>
+                            <a:srgbClr val="FF0000"/>
+                          </a:solidFill>
+                          <a:effectLst/>
+                        </a:rPr>
+                        <a:t>(AF2)</a:t>
                       </a:r>
                     </a:p>
                     <a:p>
@@ -32453,73 +32394,40 @@
                         <a:rPr lang="ko-KR" altLang="en-US" sz="1100" b="0" kern="100" dirty="0">
                           <a:effectLst/>
                         </a:rPr>
-                        <a:t>시간과 장소에 대한 피드백이 변하지 않은 경우 본 </a:t>
+                        <a:t>시간과 장소에 대한 피드백이 하나라도 변한 경우 피드백에 대한 우선순위 재조정</a:t>
+                      </a:r>
+                      <a:r>
+                        <a:rPr lang="en-US" altLang="ko-KR" sz="1100" b="0" kern="100" dirty="0">
+                          <a:effectLst/>
+                        </a:rPr>
+                        <a:t>(step5) </a:t>
                       </a:r>
                       <a:r>
                         <a:rPr lang="ko-KR" altLang="en-US" sz="1100" b="0" kern="100" dirty="0" err="1">
                           <a:effectLst/>
                         </a:rPr>
-                        <a:t>유스케이스를</a:t>
+                        <a:t>서브플로우를</a:t>
                       </a:r>
                       <a:r>
                         <a:rPr lang="ko-KR" altLang="en-US" sz="1100" b="0" kern="100" dirty="0">
                           <a:effectLst/>
                         </a:rPr>
-                        <a:t> 종료한다</a:t>
+                        <a:t> 수행한다</a:t>
                       </a:r>
                       <a:r>
                         <a:rPr lang="en-US" altLang="ko-KR" sz="1100" b="0" kern="100" dirty="0">
                           <a:effectLst/>
                         </a:rPr>
-                        <a:t>.</a:t>
-                      </a:r>
-                    </a:p>
-                    <a:p>
-                      <a:pPr marL="648000" indent="0" algn="just" latinLnBrk="1">
-                        <a:lnSpc>
-                          <a:spcPct val="115000"/>
-                        </a:lnSpc>
-                        <a:spcAft>
-                          <a:spcPts val="0"/>
-                        </a:spcAft>
-                        <a:buFontTx/>
-                        <a:buNone/>
-                      </a:pPr>
+                        <a:t>. </a:t>
+                      </a:r>
                       <a:r>
                         <a:rPr lang="en-US" altLang="ko-KR" sz="1100" b="0" kern="100" dirty="0">
-                          <a:effectLst/>
-                        </a:rPr>
-                        <a:t>-</a:t>
-                      </a:r>
-                      <a:r>
-                        <a:rPr lang="ko-KR" altLang="en-US" sz="1100" b="0" kern="100" dirty="0">
-                          <a:effectLst/>
-                        </a:rPr>
-                        <a:t>시간과 장소에 대한 피드백이 하나라도 변한 경우 피드백에 대한 우선순위 재조정</a:t>
-                      </a:r>
-                      <a:r>
-                        <a:rPr lang="en-US" altLang="ko-KR" sz="1100" b="0" kern="100" dirty="0">
-                          <a:effectLst/>
-                        </a:rPr>
-                        <a:t>(step5) </a:t>
-                      </a:r>
-                      <a:r>
-                        <a:rPr lang="ko-KR" altLang="en-US" sz="1100" b="0" kern="100" dirty="0" err="1">
-                          <a:effectLst/>
-                        </a:rPr>
-                        <a:t>서브플로우를</a:t>
-                      </a:r>
-                      <a:r>
-                        <a:rPr lang="ko-KR" altLang="en-US" sz="1100" b="0" kern="100" dirty="0">
-                          <a:effectLst/>
-                        </a:rPr>
-                        <a:t> 수행한다</a:t>
-                      </a:r>
-                      <a:r>
-                        <a:rPr lang="en-US" altLang="ko-KR" sz="1100" b="0" kern="100" dirty="0">
-                          <a:effectLst/>
-                        </a:rPr>
-                        <a:t>.</a:t>
+                          <a:solidFill>
+                            <a:srgbClr val="FF0000"/>
+                          </a:solidFill>
+                          <a:effectLst/>
+                        </a:rPr>
+                        <a:t>(AF3)</a:t>
                       </a:r>
                     </a:p>
                     <a:p>
@@ -32630,7 +32538,7 @@
                         <a:rPr lang="ko-KR" altLang="en-US" sz="1100" b="0" kern="100" dirty="0">
                           <a:effectLst/>
                         </a:rPr>
-                        <a:t>시간과 장소에 대한 피드백이 모두 </a:t>
+                        <a:t>시간과 장소에 대한 피드백이 하나라도 </a:t>
                       </a:r>
                       <a:r>
                         <a:rPr lang="en-US" altLang="ko-KR" sz="1100" b="0" kern="100" dirty="0">
@@ -32639,34 +32547,52 @@
                         <a:t>‘</a:t>
                       </a:r>
                       <a:r>
+                        <a:rPr lang="ko-KR" altLang="en-US" sz="1100" b="0" kern="100" dirty="0" err="1">
+                          <a:effectLst/>
+                        </a:rPr>
+                        <a:t>좋음＇혹은</a:t>
+                      </a:r>
+                      <a:r>
                         <a:rPr lang="ko-KR" altLang="en-US" sz="1100" b="0" kern="100" dirty="0">
                           <a:effectLst/>
                         </a:rPr>
-                        <a:t>보통</a:t>
+                        <a:t> </a:t>
                       </a:r>
                       <a:r>
                         <a:rPr lang="en-US" altLang="ko-KR" sz="1100" b="0" kern="100" dirty="0">
                           <a:effectLst/>
                         </a:rPr>
-                        <a:t>’</a:t>
+                        <a:t>‘</a:t>
+                      </a:r>
+                      <a:r>
+                        <a:rPr lang="ko-KR" altLang="en-US" sz="1100" b="0" kern="100" dirty="0" err="1">
+                          <a:effectLst/>
+                        </a:rPr>
+                        <a:t>나쁨＇이었을</a:t>
                       </a:r>
                       <a:r>
                         <a:rPr lang="ko-KR" altLang="en-US" sz="1100" b="0" kern="100" dirty="0">
                           <a:effectLst/>
                         </a:rPr>
-                        <a:t>이었을 경우 본 </a:t>
+                        <a:t> 경우 피드백에 대한 우선순위 재조정</a:t>
+                      </a:r>
+                      <a:r>
+                        <a:rPr lang="en-US" altLang="ko-KR" sz="1100" b="0" kern="100" dirty="0">
+                          <a:effectLst/>
+                        </a:rPr>
+                        <a:t>(step5) </a:t>
                       </a:r>
                       <a:r>
                         <a:rPr lang="ko-KR" altLang="en-US" sz="1100" b="0" kern="100" dirty="0" err="1">
                           <a:effectLst/>
                         </a:rPr>
-                        <a:t>유스케이스를</a:t>
+                        <a:t>서브플로우를</a:t>
                       </a:r>
                       <a:r>
                         <a:rPr lang="ko-KR" altLang="en-US" sz="1100" b="0" kern="100" dirty="0">
                           <a:effectLst/>
                         </a:rPr>
-                        <a:t> 종료한다</a:t>
+                        <a:t> 수행한다</a:t>
                       </a:r>
                       <a:r>
                         <a:rPr lang="en-US" altLang="ko-KR" sz="1100" b="0" kern="100" dirty="0">
@@ -32674,98 +32600,23 @@
                         </a:rPr>
                         <a:t>.</a:t>
                       </a:r>
-                    </a:p>
-                    <a:p>
-                      <a:pPr marL="648000" indent="0" algn="just" latinLnBrk="1">
-                        <a:lnSpc>
-                          <a:spcPct val="115000"/>
-                        </a:lnSpc>
-                        <a:spcAft>
-                          <a:spcPts val="0"/>
-                        </a:spcAft>
-                        <a:buFontTx/>
-                        <a:buNone/>
-                      </a:pPr>
                       <a:r>
                         <a:rPr lang="en-US" altLang="ko-KR" sz="1100" b="0" kern="100" dirty="0">
-                          <a:effectLst/>
-                        </a:rPr>
-                        <a:t>-</a:t>
-                      </a:r>
-                      <a:r>
-                        <a:rPr lang="ko-KR" altLang="en-US" sz="1100" b="0" kern="100" dirty="0">
-                          <a:effectLst/>
-                        </a:rPr>
-                        <a:t>시간과 장소에 대한 피드백이 하나라도 </a:t>
+                          <a:solidFill>
+                            <a:schemeClr val="tx1"/>
+                          </a:solidFill>
+                          <a:effectLst/>
+                        </a:rPr>
+                        <a:t> </a:t>
                       </a:r>
                       <a:r>
                         <a:rPr lang="en-US" altLang="ko-KR" sz="1100" b="0" kern="100" dirty="0">
-                          <a:effectLst/>
-                        </a:rPr>
-                        <a:t>‘</a:t>
-                      </a:r>
-                      <a:r>
-                        <a:rPr lang="ko-KR" altLang="en-US" sz="1100" b="0" kern="100" dirty="0" err="1">
-                          <a:effectLst/>
-                        </a:rPr>
-                        <a:t>좋음＇혹은</a:t>
-                      </a:r>
-                      <a:r>
-                        <a:rPr lang="ko-KR" altLang="en-US" sz="1100" b="0" kern="100" dirty="0">
-                          <a:effectLst/>
-                        </a:rPr>
-                        <a:t> </a:t>
-                      </a:r>
-                      <a:r>
-                        <a:rPr lang="en-US" altLang="ko-KR" sz="1100" b="0" kern="100" dirty="0">
-                          <a:effectLst/>
-                        </a:rPr>
-                        <a:t>‘</a:t>
-                      </a:r>
-                      <a:r>
-                        <a:rPr lang="ko-KR" altLang="en-US" sz="1100" b="0" kern="100" dirty="0" err="1">
-                          <a:effectLst/>
-                        </a:rPr>
-                        <a:t>나쁨＇이었을</a:t>
-                      </a:r>
-                      <a:r>
-                        <a:rPr lang="ko-KR" altLang="en-US" sz="1100" b="0" kern="100" dirty="0">
-                          <a:effectLst/>
-                        </a:rPr>
-                        <a:t> 경우 피드백에 대한 우선순위 재조정</a:t>
-                      </a:r>
-                      <a:r>
-                        <a:rPr lang="en-US" altLang="ko-KR" sz="1100" b="0" kern="100" dirty="0">
-                          <a:effectLst/>
-                        </a:rPr>
-                        <a:t>(step5) </a:t>
-                      </a:r>
-                      <a:r>
-                        <a:rPr lang="ko-KR" altLang="en-US" sz="1100" b="0" kern="100" dirty="0" err="1">
-                          <a:effectLst/>
-                        </a:rPr>
-                        <a:t>서브플로우를</a:t>
-                      </a:r>
-                      <a:r>
-                        <a:rPr lang="ko-KR" altLang="en-US" sz="1100" b="0" kern="100" dirty="0">
-                          <a:effectLst/>
-                        </a:rPr>
-                        <a:t> 수행한다</a:t>
-                      </a:r>
-                      <a:r>
-                        <a:rPr lang="en-US" altLang="ko-KR" sz="1100" b="0" kern="100" dirty="0">
-                          <a:effectLst/>
-                        </a:rPr>
-                        <a:t>.</a:t>
-                      </a:r>
-                      <a:r>
-                        <a:rPr lang="en-US" altLang="ko-KR" sz="1100" b="0" kern="100" dirty="0">
-                          <a:solidFill>
-                            <a:schemeClr val="tx1"/>
-                          </a:solidFill>
-                          <a:effectLst/>
-                        </a:rPr>
-                        <a:t>    </a:t>
+                          <a:solidFill>
+                            <a:srgbClr val="FF0000"/>
+                          </a:solidFill>
+                          <a:effectLst/>
+                        </a:rPr>
+                        <a:t>(AF2)</a:t>
                       </a:r>
                     </a:p>
                     <a:p>
@@ -33158,7 +33009,7 @@
           <p:nvPr>
             <p:extLst>
               <p:ext uri="{D42A27DB-BD31-4B8C-83A1-F6EECF244321}">
-                <p14:modId xmlns:p14="http://schemas.microsoft.com/office/powerpoint/2010/main" val="2156727318"/>
+                <p14:modId xmlns:p14="http://schemas.microsoft.com/office/powerpoint/2010/main" val="2017477166"/>
               </p:ext>
             </p:extLst>
           </p:nvPr>
@@ -33322,7 +33173,97 @@
                           </a:solidFill>
                           <a:effectLst/>
                         </a:rPr>
-                        <a:t>피드백에 대한 우선순위 재조정</a:t>
+                        <a:t>피드백에 대한 우선순위 재조정 </a:t>
+                      </a:r>
+                      <a:r>
+                        <a:rPr lang="en-US" altLang="ko-KR" sz="1100" b="0" kern="100" dirty="0">
+                          <a:solidFill>
+                            <a:schemeClr val="accent3"/>
+                          </a:solidFill>
+                          <a:effectLst/>
+                        </a:rPr>
+                        <a:t>//</a:t>
+                      </a:r>
+                      <a:r>
+                        <a:rPr lang="ko-KR" altLang="en-US" sz="1100" b="0" kern="100" dirty="0">
+                          <a:solidFill>
+                            <a:schemeClr val="accent3"/>
+                          </a:solidFill>
+                          <a:effectLst/>
+                        </a:rPr>
+                        <a:t>수정은 </a:t>
+                      </a:r>
+                      <a:r>
+                        <a:rPr lang="ko-KR" altLang="en-US" sz="1100" b="0" kern="100" dirty="0" err="1">
+                          <a:solidFill>
+                            <a:schemeClr val="accent3"/>
+                          </a:solidFill>
+                          <a:effectLst/>
+                        </a:rPr>
+                        <a:t>뭐에서</a:t>
+                      </a:r>
+                      <a:r>
+                        <a:rPr lang="ko-KR" altLang="en-US" sz="1100" b="0" kern="100" dirty="0">
+                          <a:solidFill>
+                            <a:schemeClr val="accent3"/>
+                          </a:solidFill>
+                          <a:effectLst/>
+                        </a:rPr>
+                        <a:t> 뭘로 </a:t>
+                      </a:r>
+                      <a:r>
+                        <a:rPr lang="ko-KR" altLang="en-US" sz="1100" b="0" kern="100" dirty="0" err="1">
+                          <a:solidFill>
+                            <a:schemeClr val="accent3"/>
+                          </a:solidFill>
+                          <a:effectLst/>
+                        </a:rPr>
+                        <a:t>바꼈는지</a:t>
+                      </a:r>
+                      <a:r>
+                        <a:rPr lang="ko-KR" altLang="en-US" sz="1100" b="0" kern="100" dirty="0">
+                          <a:solidFill>
+                            <a:schemeClr val="accent3"/>
+                          </a:solidFill>
+                          <a:effectLst/>
+                        </a:rPr>
+                        <a:t> </a:t>
+                      </a:r>
+                      <a:r>
+                        <a:rPr lang="ko-KR" altLang="en-US" sz="1100" b="0" kern="100" dirty="0" err="1">
+                          <a:solidFill>
+                            <a:schemeClr val="accent3"/>
+                          </a:solidFill>
+                          <a:effectLst/>
+                        </a:rPr>
+                        <a:t>계산해야함</a:t>
+                      </a:r>
+                      <a:r>
+                        <a:rPr lang="en-US" altLang="ko-KR" sz="1100" b="0" kern="100" dirty="0">
+                          <a:solidFill>
+                            <a:schemeClr val="accent3"/>
+                          </a:solidFill>
+                          <a:effectLst/>
+                        </a:rPr>
+                        <a:t>. </a:t>
+                      </a:r>
+                      <a:r>
+                        <a:rPr lang="ko-KR" altLang="en-US" sz="1100" b="0" kern="100" dirty="0">
+                          <a:solidFill>
+                            <a:schemeClr val="accent3"/>
+                          </a:solidFill>
+                          <a:effectLst/>
+                        </a:rPr>
+                        <a:t>삭제는 역으로 수행해야함</a:t>
+                      </a:r>
+                      <a:r>
+                        <a:rPr lang="en-US" altLang="ko-KR" sz="1100" b="0" kern="100" dirty="0">
+                          <a:solidFill>
+                            <a:schemeClr val="accent3"/>
+                          </a:solidFill>
+                          <a:effectLst/>
+                        </a:rPr>
+                        <a:t>.</a:t>
                       </a:r>
                       <a:endParaRPr lang="en-US" altLang="ko-KR" sz="1100" b="0" kern="100" dirty="0">
                         <a:solidFill>
@@ -33508,7 +33449,16 @@
                           </a:solidFill>
                           <a:effectLst/>
                         </a:rPr>
-                        <a:t>.</a:t>
+                        <a:t>. </a:t>
+                      </a:r>
+                      <a:r>
+                        <a:rPr lang="en-US" altLang="ko-KR" sz="1100" b="0" kern="100" dirty="0">
+                          <a:solidFill>
+                            <a:srgbClr val="FF0000"/>
+                          </a:solidFill>
+                          <a:effectLst/>
+                        </a:rPr>
+                        <a:t>(AF4)</a:t>
                       </a:r>
                     </a:p>
                     <a:p>
@@ -33583,7 +33533,16 @@
                           </a:solidFill>
                           <a:effectLst/>
                         </a:rPr>
-                        <a:t>.</a:t>
+                        <a:t>. </a:t>
+                      </a:r>
+                      <a:r>
+                        <a:rPr lang="en-US" altLang="ko-KR" sz="1100" b="0" kern="100" dirty="0">
+                          <a:solidFill>
+                            <a:srgbClr val="FF0000"/>
+                          </a:solidFill>
+                          <a:effectLst/>
+                        </a:rPr>
+                        <a:t>(AF4)</a:t>
                       </a:r>
                     </a:p>
                     <a:p>
@@ -33697,7 +33656,16 @@
                           </a:solidFill>
                           <a:effectLst/>
                         </a:rPr>
-                        <a:t>.</a:t>
+                        <a:t>. </a:t>
+                      </a:r>
+                      <a:r>
+                        <a:rPr lang="en-US" altLang="ko-KR" sz="1100" b="0" kern="100" dirty="0">
+                          <a:solidFill>
+                            <a:srgbClr val="FF0000"/>
+                          </a:solidFill>
+                          <a:effectLst/>
+                        </a:rPr>
+                        <a:t>(AF4)</a:t>
                       </a:r>
                     </a:p>
                     <a:p>
@@ -33772,91 +33740,16 @@
                           </a:solidFill>
                           <a:effectLst/>
                         </a:rPr>
-                        <a:t>.</a:t>
-                      </a:r>
-                    </a:p>
-                    <a:p>
-                      <a:pPr marL="648000" indent="0" algn="just" latinLnBrk="1">
-                        <a:lnSpc>
-                          <a:spcPct val="115000"/>
-                        </a:lnSpc>
-                        <a:spcAft>
-                          <a:spcPts val="0"/>
-                        </a:spcAft>
-                        <a:buFontTx/>
-                        <a:buNone/>
-                      </a:pPr>
-                      <a:r>
-                        <a:rPr lang="ko-KR" altLang="en-US" sz="1100" b="0" kern="100" dirty="0">
-                          <a:solidFill>
-                            <a:schemeClr val="tx1"/>
-                          </a:solidFill>
-                          <a:effectLst/>
-                        </a:rPr>
-                        <a:t>가중치가 범위</a:t>
+                        <a:t>. </a:t>
                       </a:r>
                       <a:r>
                         <a:rPr lang="en-US" altLang="ko-KR" sz="1100" b="0" kern="100" dirty="0">
                           <a:solidFill>
-                            <a:schemeClr val="tx1"/>
-                          </a:solidFill>
-                          <a:effectLst/>
-                        </a:rPr>
-                        <a:t>(</a:t>
-                      </a:r>
-                      <a:r>
-                        <a:rPr lang="ko-KR" altLang="en-US" sz="1100" b="0" kern="100" dirty="0">
-                          <a:solidFill>
-                            <a:schemeClr val="tx1"/>
-                          </a:solidFill>
-                          <a:effectLst/>
-                        </a:rPr>
-                        <a:t>조정 가중치 </a:t>
-                      </a:r>
-                      <a:r>
-                        <a:rPr lang="en-US" altLang="ko-KR" sz="1100" b="0" kern="100" dirty="0">
-                          <a:solidFill>
-                            <a:schemeClr val="tx1"/>
-                          </a:solidFill>
-                          <a:effectLst/>
-                        </a:rPr>
-                        <a:t>: 0~20, </a:t>
-                      </a:r>
-                      <a:r>
-                        <a:rPr lang="ko-KR" altLang="en-US" sz="1100" b="0" kern="100" dirty="0">
-                          <a:solidFill>
-                            <a:schemeClr val="tx1"/>
-                          </a:solidFill>
-                          <a:effectLst/>
-                        </a:rPr>
-                        <a:t>시간 가중치 </a:t>
-                      </a:r>
-                      <a:r>
-                        <a:rPr lang="en-US" altLang="ko-KR" sz="1100" b="0" kern="100" dirty="0">
-                          <a:solidFill>
-                            <a:schemeClr val="tx1"/>
-                          </a:solidFill>
-                          <a:effectLst/>
-                        </a:rPr>
-                        <a:t>: 0.0~2.0)</a:t>
-                      </a:r>
-                      <a:r>
-                        <a:rPr lang="ko-KR" altLang="en-US" sz="1100" b="0" kern="100" dirty="0">
-                          <a:solidFill>
-                            <a:schemeClr val="tx1"/>
-                          </a:solidFill>
-                          <a:effectLst/>
-                        </a:rPr>
-                        <a:t>를 벗어나는 경우 조정치를 변동하지 않는다</a:t>
-                      </a:r>
-                      <a:r>
-                        <a:rPr lang="en-US" altLang="ko-KR" sz="1100" b="0" kern="100" dirty="0">
-                          <a:solidFill>
-                            <a:schemeClr val="tx1"/>
-                          </a:solidFill>
-                          <a:effectLst/>
-                        </a:rPr>
-                        <a:t>.</a:t>
+                            <a:srgbClr val="FF0000"/>
+                          </a:solidFill>
+                          <a:effectLst/>
+                        </a:rPr>
+                        <a:t>(AF4)</a:t>
                       </a:r>
                     </a:p>
                     <a:p>
@@ -33958,7 +33851,7 @@
                           </a:solidFill>
                           <a:effectLst/>
                         </a:rPr>
-                        <a:t>.</a:t>
+                        <a:t>. </a:t>
                       </a:r>
                     </a:p>
                     <a:p>
@@ -36923,14 +36816,14 @@
           <p:nvPr>
             <p:extLst>
               <p:ext uri="{D42A27DB-BD31-4B8C-83A1-F6EECF244321}">
-                <p14:modId xmlns:p14="http://schemas.microsoft.com/office/powerpoint/2010/main" val="3735291409"/>
+                <p14:modId xmlns:p14="http://schemas.microsoft.com/office/powerpoint/2010/main" val="802641246"/>
               </p:ext>
             </p:extLst>
           </p:nvPr>
         </p:nvGraphicFramePr>
         <p:xfrm>
           <a:off x="566056" y="1277257"/>
-          <a:ext cx="7953829" cy="1854609"/>
+          <a:ext cx="7953829" cy="3678535"/>
         </p:xfrm>
         <a:graphic>
           <a:graphicData uri="http://schemas.openxmlformats.org/drawingml/2006/table">
@@ -37272,7 +37165,52 @@
                           </a:solidFill>
                           <a:effectLst/>
                         </a:rPr>
-                        <a:t>일정 정보 로드 실패</a:t>
+                        <a:t>시간</a:t>
+                      </a:r>
+                      <a:r>
+                        <a:rPr lang="en-US" altLang="ko-KR" sz="1100" b="0" kern="100" baseline="0" dirty="0">
+                          <a:solidFill>
+                            <a:schemeClr val="tx1"/>
+                          </a:solidFill>
+                          <a:effectLst/>
+                        </a:rPr>
+                        <a:t>/</a:t>
+                      </a:r>
+                      <a:r>
+                        <a:rPr lang="ko-KR" altLang="en-US" sz="1100" b="0" kern="100" baseline="0" dirty="0">
+                          <a:solidFill>
+                            <a:schemeClr val="tx1"/>
+                          </a:solidFill>
+                          <a:effectLst/>
+                        </a:rPr>
+                        <a:t>장소 피드백이 모두 </a:t>
+                      </a:r>
+                      <a:r>
+                        <a:rPr lang="en-US" altLang="ko-KR" sz="1100" b="0" kern="100" baseline="0" dirty="0">
+                          <a:solidFill>
+                            <a:schemeClr val="tx1"/>
+                          </a:solidFill>
+                          <a:effectLst/>
+                        </a:rPr>
+                        <a:t>‘</a:t>
+                      </a:r>
+                      <a:r>
+                        <a:rPr lang="ko-KR" altLang="en-US" sz="1100" b="0" kern="100" baseline="0" dirty="0" err="1">
+                          <a:solidFill>
+                            <a:schemeClr val="tx1"/>
+                          </a:solidFill>
+                          <a:effectLst/>
+                        </a:rPr>
+                        <a:t>보통＇인</a:t>
+                      </a:r>
+                      <a:r>
+                        <a:rPr lang="ko-KR" altLang="en-US" sz="1100" b="0" kern="100" baseline="0" dirty="0">
+                          <a:solidFill>
+                            <a:schemeClr val="tx1"/>
+                          </a:solidFill>
+                          <a:effectLst/>
+                        </a:rPr>
+                        <a:t> 경우</a:t>
                       </a:r>
                       <a:endParaRPr lang="en-US" altLang="ko-KR" sz="1100" b="0" kern="100" baseline="0" dirty="0">
                         <a:solidFill>
@@ -37315,7 +37253,7 @@
                           </a:solidFill>
                           <a:effectLst/>
                         </a:rPr>
-                        <a:t>: Basic Flow 1.2</a:t>
+                        <a:t>: Basic Flow 3.2, Basic Flow 4.3</a:t>
                       </a:r>
                     </a:p>
                     <a:p>
@@ -37343,7 +37281,25 @@
                           </a:solidFill>
                           <a:effectLst/>
                         </a:rPr>
-                        <a:t>시스템은 </a:t>
+                        <a:t>시스템은 피드백에 대한 우선순위 재조정 과정 없이 본 </a:t>
+                      </a:r>
+                      <a:r>
+                        <a:rPr lang="ko-KR" altLang="en-US" sz="1100" b="0" kern="100" baseline="0" dirty="0" err="1">
+                          <a:solidFill>
+                            <a:schemeClr val="tx1"/>
+                          </a:solidFill>
+                          <a:effectLst/>
+                        </a:rPr>
+                        <a:t>유스케이스를</a:t>
+                      </a:r>
+                      <a:r>
+                        <a:rPr lang="ko-KR" altLang="en-US" sz="1100" b="0" kern="100" baseline="0" dirty="0">
+                          <a:solidFill>
+                            <a:schemeClr val="tx1"/>
+                          </a:solidFill>
+                          <a:effectLst/>
+                        </a:rPr>
+                        <a:t> 종료한다</a:t>
                       </a:r>
                       <a:r>
                         <a:rPr lang="en-US" altLang="ko-KR" sz="1100" b="0" kern="100" baseline="0" dirty="0">
@@ -37352,7 +37308,60 @@
                           </a:solidFill>
                           <a:effectLst/>
                         </a:rPr>
-                        <a:t>‘</a:t>
+                        <a:t>.</a:t>
+                      </a:r>
+                    </a:p>
+                    <a:p>
+                      <a:pPr marL="0" marR="0" lvl="0" indent="0" algn="just" defTabSz="914400" rtl="0" eaLnBrk="1" fontAlgn="auto" latinLnBrk="1" hangingPunct="1">
+                        <a:lnSpc>
+                          <a:spcPct val="115000"/>
+                        </a:lnSpc>
+                        <a:spcBef>
+                          <a:spcPts val="0"/>
+                        </a:spcBef>
+                        <a:spcAft>
+                          <a:spcPts val="0"/>
+                        </a:spcAft>
+                        <a:buClrTx/>
+                        <a:buSzTx/>
+                        <a:buFontTx/>
+                        <a:buNone/>
+                        <a:tabLst/>
+                        <a:defRPr/>
+                      </a:pPr>
+                      <a:endParaRPr lang="en-US" altLang="ko-KR" sz="1100" b="0" kern="100" baseline="0" dirty="0">
+                        <a:solidFill>
+                          <a:schemeClr val="tx1"/>
+                        </a:solidFill>
+                        <a:effectLst/>
+                      </a:endParaRPr>
+                    </a:p>
+                    <a:p>
+                      <a:pPr marL="0" marR="0" lvl="0" indent="0" algn="just" defTabSz="914400" rtl="0" eaLnBrk="1" fontAlgn="auto" latinLnBrk="1" hangingPunct="1">
+                        <a:lnSpc>
+                          <a:spcPct val="115000"/>
+                        </a:lnSpc>
+                        <a:spcBef>
+                          <a:spcPts val="0"/>
+                        </a:spcBef>
+                        <a:spcAft>
+                          <a:spcPts val="0"/>
+                        </a:spcAft>
+                        <a:buClrTx/>
+                        <a:buSzTx/>
+                        <a:buFontTx/>
+                        <a:buNone/>
+                        <a:tabLst/>
+                        <a:defRPr/>
+                      </a:pPr>
+                      <a:r>
+                        <a:rPr lang="en-US" altLang="ko-KR" sz="1100" b="0" kern="100" baseline="0" dirty="0">
+                          <a:solidFill>
+                            <a:schemeClr val="tx1"/>
+                          </a:solidFill>
+                          <a:effectLst/>
+                        </a:rPr>
+                        <a:t>AF3. </a:t>
                       </a:r>
                       <a:r>
                         <a:rPr lang="ko-KR" altLang="en-US" sz="1100" b="0" kern="100" baseline="0" dirty="0">
@@ -37361,7 +37370,7 @@
                           </a:solidFill>
                           <a:effectLst/>
                         </a:rPr>
-                        <a:t>일정 정보를 불러올 수 없습니다</a:t>
+                        <a:t>시간</a:t>
                       </a:r>
                       <a:r>
                         <a:rPr lang="en-US" altLang="ko-KR" sz="1100" b="0" kern="100" baseline="0" dirty="0">
@@ -37370,7 +37379,7 @@
                           </a:solidFill>
                           <a:effectLst/>
                         </a:rPr>
-                        <a:t>.’ </a:t>
+                        <a:t>/</a:t>
                       </a:r>
                       <a:r>
                         <a:rPr lang="ko-KR" altLang="en-US" sz="1100" b="0" kern="100" baseline="0" dirty="0">
@@ -37379,7 +37388,78 @@
                           </a:solidFill>
                           <a:effectLst/>
                         </a:rPr>
-                        <a:t>메시지를 화면 하단에 출력한 후 본 </a:t>
+                        <a:t>장소 피드백이 변하지 않은 경우</a:t>
+                      </a:r>
+                      <a:endParaRPr lang="en-US" altLang="ko-KR" sz="1100" b="0" kern="100" baseline="0" dirty="0">
+                        <a:solidFill>
+                          <a:schemeClr val="tx1"/>
+                        </a:solidFill>
+                        <a:effectLst/>
+                      </a:endParaRPr>
+                    </a:p>
+                    <a:p>
+                      <a:pPr marL="457200" marR="0" lvl="1" indent="0" algn="just" defTabSz="914400" rtl="0" eaLnBrk="1" fontAlgn="auto" latinLnBrk="1" hangingPunct="1">
+                        <a:lnSpc>
+                          <a:spcPct val="115000"/>
+                        </a:lnSpc>
+                        <a:spcBef>
+                          <a:spcPts val="0"/>
+                        </a:spcBef>
+                        <a:spcAft>
+                          <a:spcPts val="0"/>
+                        </a:spcAft>
+                        <a:buClrTx/>
+                        <a:buSzTx/>
+                        <a:buFontTx/>
+                        <a:buNone/>
+                        <a:tabLst/>
+                        <a:defRPr/>
+                      </a:pPr>
+                      <a:r>
+                        <a:rPr lang="ko-KR" altLang="en-US" sz="1100" b="0" kern="100" baseline="0" dirty="0">
+                          <a:solidFill>
+                            <a:schemeClr val="tx1"/>
+                          </a:solidFill>
+                          <a:effectLst/>
+                        </a:rPr>
+                        <a:t>분기점 </a:t>
+                      </a:r>
+                      <a:r>
+                        <a:rPr lang="en-US" altLang="ko-KR" sz="1100" b="0" kern="100" baseline="0" dirty="0">
+                          <a:solidFill>
+                            <a:schemeClr val="tx1"/>
+                          </a:solidFill>
+                          <a:effectLst/>
+                        </a:rPr>
+                        <a:t>: Basic Flow 4.2</a:t>
+                      </a:r>
+                    </a:p>
+                    <a:p>
+                      <a:pPr marL="648000" marR="0" lvl="0" indent="0" algn="just" defTabSz="914400" rtl="0" eaLnBrk="1" fontAlgn="auto" latinLnBrk="1" hangingPunct="1">
+                        <a:lnSpc>
+                          <a:spcPct val="115000"/>
+                        </a:lnSpc>
+                        <a:spcBef>
+                          <a:spcPts val="0"/>
+                        </a:spcBef>
+                        <a:spcAft>
+                          <a:spcPts val="0"/>
+                        </a:spcAft>
+                        <a:buClrTx/>
+                        <a:buSzTx/>
+                        <a:buFontTx/>
+                        <a:buNone/>
+                        <a:tabLst/>
+                        <a:defRPr/>
+                      </a:pPr>
+                      <a:r>
+                        <a:rPr lang="ko-KR" altLang="en-US" sz="1100" b="0" kern="100" baseline="0" dirty="0">
+                          <a:solidFill>
+                            <a:schemeClr val="tx1"/>
+                          </a:solidFill>
+                          <a:effectLst/>
+                        </a:rPr>
+                        <a:t>시스템은 피드백에 대한 우선순위 재조정 과정 없이 본 </a:t>
                       </a:r>
                       <a:r>
                         <a:rPr lang="ko-KR" altLang="en-US" sz="1100" b="0" kern="100" baseline="0" dirty="0" err="1">
@@ -37408,6 +37488,227 @@
                         </a:rPr>
                         <a:t>.</a:t>
                       </a:r>
+                    </a:p>
+                    <a:p>
+                      <a:pPr marL="0" marR="0" lvl="0" indent="0" algn="just" defTabSz="914400" rtl="0" eaLnBrk="1" fontAlgn="auto" latinLnBrk="1" hangingPunct="1">
+                        <a:lnSpc>
+                          <a:spcPct val="115000"/>
+                        </a:lnSpc>
+                        <a:spcBef>
+                          <a:spcPts val="0"/>
+                        </a:spcBef>
+                        <a:spcAft>
+                          <a:spcPts val="0"/>
+                        </a:spcAft>
+                        <a:buClrTx/>
+                        <a:buSzTx/>
+                        <a:buFontTx/>
+                        <a:buNone/>
+                        <a:tabLst/>
+                        <a:defRPr/>
+                      </a:pPr>
+                      <a:endParaRPr lang="en-US" altLang="ko-KR" sz="1100" b="0" kern="100" baseline="0" dirty="0">
+                        <a:solidFill>
+                          <a:schemeClr val="tx1"/>
+                        </a:solidFill>
+                        <a:effectLst/>
+                      </a:endParaRPr>
+                    </a:p>
+                    <a:p>
+                      <a:pPr marL="0" marR="0" lvl="0" indent="0" algn="just" defTabSz="914400" rtl="0" eaLnBrk="1" fontAlgn="auto" latinLnBrk="1" hangingPunct="1">
+                        <a:lnSpc>
+                          <a:spcPct val="115000"/>
+                        </a:lnSpc>
+                        <a:spcBef>
+                          <a:spcPts val="0"/>
+                        </a:spcBef>
+                        <a:spcAft>
+                          <a:spcPts val="0"/>
+                        </a:spcAft>
+                        <a:buClrTx/>
+                        <a:buSzTx/>
+                        <a:buFontTx/>
+                        <a:buNone/>
+                        <a:tabLst/>
+                        <a:defRPr/>
+                      </a:pPr>
+                      <a:r>
+                        <a:rPr lang="en-US" altLang="ko-KR" sz="1100" b="0" kern="100" baseline="0" dirty="0">
+                          <a:solidFill>
+                            <a:schemeClr val="tx1"/>
+                          </a:solidFill>
+                          <a:effectLst/>
+                        </a:rPr>
+                        <a:t>AF4. </a:t>
+                      </a:r>
+                      <a:r>
+                        <a:rPr lang="ko-KR" altLang="en-US" sz="1100" b="0" kern="100" baseline="0" dirty="0">
+                          <a:solidFill>
+                            <a:schemeClr val="tx1"/>
+                          </a:solidFill>
+                          <a:effectLst/>
+                        </a:rPr>
+                        <a:t>가중치 범위를 벗어난 경우</a:t>
+                      </a:r>
+                      <a:endParaRPr lang="en-US" altLang="ko-KR" sz="1100" b="0" kern="100" baseline="0" dirty="0">
+                        <a:solidFill>
+                          <a:schemeClr val="tx1"/>
+                        </a:solidFill>
+                        <a:effectLst/>
+                      </a:endParaRPr>
+                    </a:p>
+                    <a:p>
+                      <a:pPr marL="457200" marR="0" lvl="0" indent="0" algn="just" defTabSz="914400" rtl="0" eaLnBrk="1" fontAlgn="auto" latinLnBrk="1" hangingPunct="1">
+                        <a:lnSpc>
+                          <a:spcPct val="115000"/>
+                        </a:lnSpc>
+                        <a:spcBef>
+                          <a:spcPts val="0"/>
+                        </a:spcBef>
+                        <a:spcAft>
+                          <a:spcPts val="0"/>
+                        </a:spcAft>
+                        <a:buClrTx/>
+                        <a:buSzTx/>
+                        <a:buFontTx/>
+                        <a:buNone/>
+                        <a:tabLst/>
+                        <a:defRPr/>
+                      </a:pPr>
+                      <a:r>
+                        <a:rPr lang="ko-KR" altLang="en-US" sz="1100" b="0" kern="100" baseline="0" dirty="0">
+                          <a:solidFill>
+                            <a:schemeClr val="tx1"/>
+                          </a:solidFill>
+                          <a:effectLst/>
+                        </a:rPr>
+                        <a:t>분기점 </a:t>
+                      </a:r>
+                      <a:r>
+                        <a:rPr lang="en-US" altLang="ko-KR" sz="1100" b="0" kern="100" baseline="0" dirty="0">
+                          <a:solidFill>
+                            <a:schemeClr val="tx1"/>
+                          </a:solidFill>
+                          <a:effectLst/>
+                        </a:rPr>
+                        <a:t>: Basic Flow 5.1</a:t>
+                      </a:r>
+                    </a:p>
+                    <a:p>
+                      <a:pPr marL="648000" marR="0" lvl="0" indent="0" algn="just" defTabSz="914400" rtl="0" eaLnBrk="1" fontAlgn="auto" latinLnBrk="1" hangingPunct="1">
+                        <a:lnSpc>
+                          <a:spcPct val="115000"/>
+                        </a:lnSpc>
+                        <a:spcBef>
+                          <a:spcPts val="0"/>
+                        </a:spcBef>
+                        <a:spcAft>
+                          <a:spcPts val="0"/>
+                        </a:spcAft>
+                        <a:buClrTx/>
+                        <a:buSzTx/>
+                        <a:buFontTx/>
+                        <a:buNone/>
+                        <a:tabLst/>
+                        <a:defRPr/>
+                      </a:pPr>
+                      <a:r>
+                        <a:rPr lang="ko-KR" altLang="en-US" sz="1100" b="0" kern="100" baseline="0" dirty="0">
+                          <a:solidFill>
+                            <a:schemeClr val="tx1"/>
+                          </a:solidFill>
+                          <a:effectLst/>
+                        </a:rPr>
+                        <a:t>가중치의 증감이 조정 가중치 범위</a:t>
+                      </a:r>
+                      <a:r>
+                        <a:rPr lang="en-US" altLang="ko-KR" sz="1100" b="0" kern="100" baseline="0" dirty="0">
+                          <a:solidFill>
+                            <a:schemeClr val="tx1"/>
+                          </a:solidFill>
+                          <a:effectLst/>
+                        </a:rPr>
+                        <a:t>(0~20)</a:t>
+                      </a:r>
+                      <a:r>
+                        <a:rPr lang="ko-KR" altLang="en-US" sz="1100" b="0" kern="100" baseline="0" dirty="0">
+                          <a:solidFill>
+                            <a:schemeClr val="tx1"/>
+                          </a:solidFill>
+                          <a:effectLst/>
+                        </a:rPr>
+                        <a:t>나 시간 가중치 범위</a:t>
+                      </a:r>
+                      <a:r>
+                        <a:rPr lang="en-US" altLang="ko-KR" sz="1100" b="0" kern="100" baseline="0" dirty="0">
+                          <a:solidFill>
+                            <a:schemeClr val="tx1"/>
+                          </a:solidFill>
+                          <a:effectLst/>
+                        </a:rPr>
+                        <a:t>(0.0~2.0)</a:t>
+                      </a:r>
+                      <a:r>
+                        <a:rPr lang="ko-KR" altLang="en-US" sz="1100" b="0" kern="100" baseline="0" dirty="0">
+                          <a:solidFill>
+                            <a:schemeClr val="tx1"/>
+                          </a:solidFill>
+                          <a:effectLst/>
+                        </a:rPr>
+                        <a:t>를 벗어난 경우 시스템은 해당 가중치를 최대치 혹은 최소치로 설정하고 다음 </a:t>
+                      </a:r>
+                      <a:r>
+                        <a:rPr lang="en-US" altLang="ko-KR" sz="1100" b="0" kern="100" baseline="0" dirty="0">
+                          <a:solidFill>
+                            <a:schemeClr val="tx1"/>
+                          </a:solidFill>
+                          <a:effectLst/>
+                        </a:rPr>
+                        <a:t>Flow</a:t>
+                      </a:r>
+                      <a:r>
+                        <a:rPr lang="ko-KR" altLang="en-US" sz="1100" b="0" kern="100" baseline="0" dirty="0">
+                          <a:solidFill>
+                            <a:schemeClr val="tx1"/>
+                          </a:solidFill>
+                          <a:effectLst/>
+                        </a:rPr>
+                        <a:t>를 진행한다</a:t>
+                      </a:r>
+                      <a:r>
+                        <a:rPr lang="en-US" altLang="ko-KR" sz="1100" b="0" kern="100" baseline="0" dirty="0">
+                          <a:solidFill>
+                            <a:schemeClr val="tx1"/>
+                          </a:solidFill>
+                          <a:effectLst/>
+                        </a:rPr>
+                        <a:t>.</a:t>
+                      </a:r>
+                    </a:p>
+                    <a:p>
+                      <a:pPr marL="648000" marR="0" lvl="0" indent="0" algn="just" defTabSz="914400" rtl="0" eaLnBrk="1" fontAlgn="auto" latinLnBrk="1" hangingPunct="1">
+                        <a:lnSpc>
+                          <a:spcPct val="115000"/>
+                        </a:lnSpc>
+                        <a:spcBef>
+                          <a:spcPts val="0"/>
+                        </a:spcBef>
+                        <a:spcAft>
+                          <a:spcPts val="0"/>
+                        </a:spcAft>
+                        <a:buClrTx/>
+                        <a:buSzTx/>
+                        <a:buFontTx/>
+                        <a:buNone/>
+                        <a:tabLst/>
+                        <a:defRPr/>
+                      </a:pPr>
+                      <a:endParaRPr lang="en-US" altLang="ko-KR" sz="1100" b="0" kern="100" baseline="0" dirty="0">
+                        <a:solidFill>
+                          <a:schemeClr val="tx1"/>
+                        </a:solidFill>
+                        <a:effectLst/>
+                      </a:endParaRPr>
                     </a:p>
                     <a:p>
                       <a:pPr marL="0" marR="0" lvl="0" indent="0" algn="just" defTabSz="914400" rtl="0" eaLnBrk="1" fontAlgn="auto" latinLnBrk="1" hangingPunct="1">

</xml_diff>